<commit_message>
Presentation work in progress
</commit_message>
<xml_diff>
--- a/documentation/src/main/resources/Monte Carlo Simulation Debugger.pptx
+++ b/documentation/src/main/resources/Monte Carlo Simulation Debugger.pptx
@@ -7,7 +7,13 @@
   <p:sldIdLst>
     <p:sldId id="256" r:id="rId2"/>
     <p:sldId id="257" r:id="rId3"/>
-    <p:sldId id="258" r:id="rId4"/>
+    <p:sldId id="259" r:id="rId4"/>
+    <p:sldId id="258" r:id="rId5"/>
+    <p:sldId id="260" r:id="rId6"/>
+    <p:sldId id="261" r:id="rId7"/>
+    <p:sldId id="262" r:id="rId8"/>
+    <p:sldId id="266" r:id="rId9"/>
+    <p:sldId id="263" r:id="rId10"/>
   </p:sldIdLst>
   <p:sldSz cx="9144000" cy="6858000" type="screen4x3"/>
   <p:notesSz cx="6858000" cy="9144000"/>
@@ -3266,89 +3272,92 @@
         </p:nvSpPr>
         <p:spPr/>
         <p:txBody>
-          <a:bodyPr/>
-          <a:lstStyle/>
-          <a:p>
-            <a:r>
-              <a:rPr lang="bg-BG" dirty="0" smtClean="0"/>
-              <a:t>Съдържание</a:t>
-            </a:r>
-            <a:endParaRPr lang="bg-BG" dirty="0"/>
-          </a:p>
-        </p:txBody>
-      </p:sp>
-      <p:sp>
-        <p:nvSpPr>
-          <p:cNvPr id="3" name="Content Placeholder 2"/>
-          <p:cNvSpPr>
-            <a:spLocks noGrp="1"/>
-          </p:cNvSpPr>
-          <p:nvPr>
-            <p:ph idx="1"/>
-          </p:nvPr>
-        </p:nvSpPr>
-        <p:spPr/>
-        <p:txBody>
           <a:bodyPr>
             <a:normAutofit/>
           </a:bodyPr>
           <a:lstStyle/>
           <a:p>
             <a:r>
-              <a:rPr lang="bg-BG" sz="2000" dirty="0" smtClean="0"/>
-              <a:t>Въведение в теорията</a:t>
-            </a:r>
-          </a:p>
-          <a:p>
-            <a:r>
-              <a:rPr lang="bg-BG" sz="2000" dirty="0" smtClean="0"/>
-              <a:t>Необходимост от решаване на дипломната задача</a:t>
-            </a:r>
-          </a:p>
-          <a:p>
-            <a:r>
-              <a:rPr lang="bg-BG" sz="2000" dirty="0" smtClean="0"/>
-              <a:t>Постановка на дипломното </a:t>
-            </a:r>
-            <a:r>
-              <a:rPr lang="bg-BG" sz="2000" dirty="0" smtClean="0"/>
-              <a:t>задание</a:t>
-            </a:r>
-            <a:endParaRPr lang="en-US" sz="2000" dirty="0" smtClean="0"/>
-          </a:p>
-          <a:p>
-            <a:r>
-              <a:rPr lang="bg-BG" sz="2000" dirty="0" smtClean="0"/>
+              <a:rPr lang="bg-BG" sz="3600" dirty="0" smtClean="0"/>
+              <a:t>Съдържание</a:t>
+            </a:r>
+            <a:endParaRPr lang="bg-BG" sz="3600" dirty="0"/>
+          </a:p>
+        </p:txBody>
+      </p:sp>
+      <p:sp>
+        <p:nvSpPr>
+          <p:cNvPr id="3" name="Content Placeholder 2"/>
+          <p:cNvSpPr>
+            <a:spLocks noGrp="1"/>
+          </p:cNvSpPr>
+          <p:nvPr>
+            <p:ph idx="1"/>
+          </p:nvPr>
+        </p:nvSpPr>
+        <p:spPr/>
+        <p:txBody>
+          <a:bodyPr>
+            <a:normAutofit/>
+          </a:bodyPr>
+          <a:lstStyle/>
+          <a:p>
+            <a:r>
+              <a:rPr lang="bg-BG" sz="1800" dirty="0" smtClean="0"/>
+              <a:t>Въведение</a:t>
+            </a:r>
+            <a:endParaRPr lang="bg-BG" sz="1800" dirty="0" smtClean="0"/>
+          </a:p>
+          <a:p>
+            <a:r>
+              <a:rPr lang="bg-BG" sz="1800" dirty="0" smtClean="0"/>
+              <a:t>Необходимост от решаване </a:t>
+            </a:r>
+            <a:r>
+              <a:rPr lang="bg-BG" sz="1800" dirty="0" smtClean="0"/>
+              <a:t>задачата</a:t>
+            </a:r>
+            <a:endParaRPr lang="bg-BG" sz="1800" dirty="0" smtClean="0"/>
+          </a:p>
+          <a:p>
+            <a:r>
+              <a:rPr lang="bg-BG" sz="1800" dirty="0" smtClean="0"/>
+              <a:t>Постановка на дипломното задание</a:t>
+            </a:r>
+            <a:endParaRPr lang="en-US" sz="1800" dirty="0" smtClean="0"/>
+          </a:p>
+          <a:p>
+            <a:r>
+              <a:rPr lang="bg-BG" sz="1800" dirty="0" smtClean="0"/>
               <a:t>Използвани технологии</a:t>
             </a:r>
-            <a:endParaRPr lang="bg-BG" sz="2000" dirty="0" smtClean="0"/>
-          </a:p>
-          <a:p>
-            <a:r>
-              <a:rPr lang="bg-BG" sz="2000" dirty="0" smtClean="0"/>
+          </a:p>
+          <a:p>
+            <a:r>
+              <a:rPr lang="bg-BG" sz="1800" dirty="0" smtClean="0"/>
               <a:t>Даннов модел - акценти</a:t>
             </a:r>
           </a:p>
           <a:p>
             <a:r>
-              <a:rPr lang="bg-BG" sz="2000" dirty="0" smtClean="0"/>
+              <a:rPr lang="bg-BG" sz="1800" dirty="0" smtClean="0"/>
               <a:t>Сървърен модул – акценти</a:t>
             </a:r>
           </a:p>
           <a:p>
             <a:r>
-              <a:rPr lang="bg-BG" sz="2000" dirty="0" smtClean="0"/>
+              <a:rPr lang="bg-BG" sz="1800" dirty="0" smtClean="0"/>
               <a:t>Клиентски модул – акценти</a:t>
             </a:r>
           </a:p>
           <a:p>
             <a:r>
-              <a:rPr lang="bg-BG" sz="2000" dirty="0" smtClean="0"/>
+              <a:rPr lang="bg-BG" sz="1800" dirty="0" smtClean="0"/>
               <a:t>Тестване и анализ на производителността</a:t>
             </a:r>
           </a:p>
           <a:p>
-            <a:endParaRPr lang="bg-BG" sz="2000" dirty="0"/>
+            <a:endParaRPr lang="bg-BG" sz="1800" dirty="0"/>
           </a:p>
         </p:txBody>
       </p:sp>
@@ -3390,13 +3399,269 @@
         <p:spPr/>
         <p:txBody>
           <a:bodyPr>
-            <a:normAutofit fontScale="90000"/>
+            <a:normAutofit/>
           </a:bodyPr>
           <a:lstStyle/>
           <a:p>
             <a:r>
-              <a:rPr lang="bg-BG" dirty="0" smtClean="0"/>
-              <a:t>Необходимост от решаване на дипломната задача</a:t>
+              <a:rPr lang="bg-BG" sz="3600" dirty="0" smtClean="0"/>
+              <a:t>Въведение</a:t>
+            </a:r>
+            <a:endParaRPr lang="bg-BG" sz="3600" dirty="0"/>
+          </a:p>
+        </p:txBody>
+      </p:sp>
+      <p:pic>
+        <p:nvPicPr>
+          <p:cNvPr id="3" name="Picture 2" descr="Practical example.png"/>
+          <p:cNvPicPr>
+            <a:picLocks noChangeAspect="1"/>
+          </p:cNvPicPr>
+          <p:nvPr/>
+        </p:nvPicPr>
+        <p:blipFill>
+          <a:blip r:embed="rId2" cstate="print"/>
+          <a:stretch>
+            <a:fillRect/>
+          </a:stretch>
+        </p:blipFill>
+        <p:spPr>
+          <a:xfrm>
+            <a:off x="1556337" y="1412776"/>
+            <a:ext cx="6031326" cy="5443799"/>
+          </a:xfrm>
+          <a:prstGeom prst="rect">
+            <a:avLst/>
+          </a:prstGeom>
+        </p:spPr>
+      </p:pic>
+    </p:spTree>
+  </p:cSld>
+  <p:clrMapOvr>
+    <a:masterClrMapping/>
+  </p:clrMapOvr>
+</p:sld>
+</file>
+
+<file path=ppt/slides/slide4.xml><?xml version="1.0" encoding="utf-8"?>
+<p:sld xmlns:a="http://schemas.openxmlformats.org/drawingml/2006/main" xmlns:r="http://schemas.openxmlformats.org/officeDocument/2006/relationships" xmlns:p="http://schemas.openxmlformats.org/presentationml/2006/main">
+  <p:cSld>
+    <p:spTree>
+      <p:nvGrpSpPr>
+        <p:cNvPr id="1" name=""/>
+        <p:cNvGrpSpPr/>
+        <p:nvPr/>
+      </p:nvGrpSpPr>
+      <p:grpSpPr>
+        <a:xfrm>
+          <a:off x="0" y="0"/>
+          <a:ext cx="0" cy="0"/>
+          <a:chOff x="0" y="0"/>
+          <a:chExt cx="0" cy="0"/>
+        </a:xfrm>
+      </p:grpSpPr>
+      <p:sp>
+        <p:nvSpPr>
+          <p:cNvPr id="2" name="Title 1"/>
+          <p:cNvSpPr>
+            <a:spLocks noGrp="1"/>
+          </p:cNvSpPr>
+          <p:nvPr>
+            <p:ph type="title"/>
+          </p:nvPr>
+        </p:nvSpPr>
+        <p:spPr/>
+        <p:txBody>
+          <a:bodyPr>
+            <a:noAutofit/>
+          </a:bodyPr>
+          <a:lstStyle/>
+          <a:p>
+            <a:r>
+              <a:rPr lang="bg-BG" sz="3600" dirty="0" smtClean="0"/>
+              <a:t>Необходимост от решаване </a:t>
+            </a:r>
+            <a:r>
+              <a:rPr lang="bg-BG" sz="3600" dirty="0" smtClean="0"/>
+              <a:t>задача</a:t>
+            </a:r>
+            <a:r>
+              <a:rPr lang="bg-BG" sz="3600" dirty="0" smtClean="0"/>
+              <a:t>та</a:t>
+            </a:r>
+            <a:endParaRPr lang="bg-BG" sz="3600" dirty="0"/>
+          </a:p>
+        </p:txBody>
+      </p:sp>
+      <p:pic>
+        <p:nvPicPr>
+          <p:cNvPr id="4" name="Picture 3" descr="FX example scenarios.png"/>
+          <p:cNvPicPr>
+            <a:picLocks noChangeAspect="1"/>
+          </p:cNvPicPr>
+          <p:nvPr/>
+        </p:nvPicPr>
+        <p:blipFill>
+          <a:blip r:embed="rId2" cstate="print"/>
+          <a:stretch>
+            <a:fillRect/>
+          </a:stretch>
+        </p:blipFill>
+        <p:spPr>
+          <a:xfrm>
+            <a:off x="286285" y="1124744"/>
+            <a:ext cx="8571429" cy="5714286"/>
+          </a:xfrm>
+          <a:prstGeom prst="rect">
+            <a:avLst/>
+          </a:prstGeom>
+        </p:spPr>
+      </p:pic>
+    </p:spTree>
+  </p:cSld>
+  <p:clrMapOvr>
+    <a:masterClrMapping/>
+  </p:clrMapOvr>
+</p:sld>
+</file>
+
+<file path=ppt/slides/slide5.xml><?xml version="1.0" encoding="utf-8"?>
+<p:sld xmlns:a="http://schemas.openxmlformats.org/drawingml/2006/main" xmlns:r="http://schemas.openxmlformats.org/officeDocument/2006/relationships" xmlns:p="http://schemas.openxmlformats.org/presentationml/2006/main">
+  <p:cSld>
+    <p:spTree>
+      <p:nvGrpSpPr>
+        <p:cNvPr id="1" name=""/>
+        <p:cNvGrpSpPr/>
+        <p:nvPr/>
+      </p:nvGrpSpPr>
+      <p:grpSpPr>
+        <a:xfrm>
+          <a:off x="0" y="0"/>
+          <a:ext cx="0" cy="0"/>
+          <a:chOff x="0" y="0"/>
+          <a:chExt cx="0" cy="0"/>
+        </a:xfrm>
+      </p:grpSpPr>
+      <p:sp>
+        <p:nvSpPr>
+          <p:cNvPr id="2" name="Title 1"/>
+          <p:cNvSpPr>
+            <a:spLocks noGrp="1"/>
+          </p:cNvSpPr>
+          <p:nvPr>
+            <p:ph type="title"/>
+          </p:nvPr>
+        </p:nvSpPr>
+        <p:spPr/>
+        <p:txBody>
+          <a:bodyPr>
+            <a:normAutofit/>
+          </a:bodyPr>
+          <a:lstStyle/>
+          <a:p>
+            <a:r>
+              <a:rPr lang="bg-BG" sz="3600" dirty="0" smtClean="0"/>
+              <a:t>Постановка на дипломното задание</a:t>
+            </a:r>
+            <a:endParaRPr lang="bg-BG" sz="3600" dirty="0"/>
+          </a:p>
+        </p:txBody>
+      </p:sp>
+      <p:pic>
+        <p:nvPicPr>
+          <p:cNvPr id="3" name="Picture 2" descr="Architecture.png"/>
+          <p:cNvPicPr>
+            <a:picLocks noChangeAspect="1"/>
+          </p:cNvPicPr>
+          <p:nvPr/>
+        </p:nvPicPr>
+        <p:blipFill>
+          <a:blip r:embed="rId2" cstate="print"/>
+          <a:stretch>
+            <a:fillRect/>
+          </a:stretch>
+        </p:blipFill>
+        <p:spPr>
+          <a:xfrm>
+            <a:off x="2555776" y="3429000"/>
+            <a:ext cx="4032448" cy="3024336"/>
+          </a:xfrm>
+          <a:prstGeom prst="rect">
+            <a:avLst/>
+          </a:prstGeom>
+        </p:spPr>
+      </p:pic>
+      <p:sp>
+        <p:nvSpPr>
+          <p:cNvPr id="4" name="TextBox 3"/>
+          <p:cNvSpPr txBox="1"/>
+          <p:nvPr/>
+        </p:nvSpPr>
+        <p:spPr>
+          <a:xfrm>
+            <a:off x="4860032" y="2038782"/>
+            <a:ext cx="4086568" cy="1200329"/>
+          </a:xfrm>
+          <a:prstGeom prst="rect">
+            <a:avLst/>
+          </a:prstGeom>
+          <a:noFill/>
+        </p:spPr>
+        <p:txBody>
+          <a:bodyPr wrap="none" rtlCol="0">
+            <a:spAutoFit/>
+          </a:bodyPr>
+          <a:lstStyle/>
+          <a:p>
+            <a:r>
+              <a:rPr lang="bg-BG" b="1" dirty="0" smtClean="0"/>
+              <a:t>Сървър</a:t>
+            </a:r>
+          </a:p>
+          <a:p>
+            <a:pPr>
+              <a:buFont typeface="Arial" pitchFamily="34" charset="0"/>
+              <a:buChar char="•"/>
+            </a:pPr>
+            <a:r>
+              <a:rPr lang="bg-BG" dirty="0" smtClean="0"/>
+              <a:t> </a:t>
+            </a:r>
+            <a:r>
+              <a:rPr lang="en-US" dirty="0" smtClean="0"/>
+              <a:t>WEB</a:t>
+            </a:r>
+            <a:r>
+              <a:rPr lang="bg-BG" dirty="0" smtClean="0"/>
+              <a:t> услуга</a:t>
+            </a:r>
+          </a:p>
+          <a:p>
+            <a:pPr>
+              <a:buFont typeface="Arial" pitchFamily="34" charset="0"/>
+              <a:buChar char="•"/>
+            </a:pPr>
+            <a:r>
+              <a:rPr lang="bg-BG" dirty="0" smtClean="0"/>
+              <a:t> </a:t>
+            </a:r>
+            <a:r>
+              <a:rPr lang="bg-BG" dirty="0" smtClean="0"/>
+              <a:t>Паралелна Монте Карло симулация</a:t>
+            </a:r>
+          </a:p>
+          <a:p>
+            <a:pPr>
+              <a:buFont typeface="Arial" pitchFamily="34" charset="0"/>
+              <a:buChar char="•"/>
+            </a:pPr>
+            <a:r>
+              <a:rPr lang="bg-BG" dirty="0" smtClean="0"/>
+              <a:t> </a:t>
+            </a:r>
+            <a:r>
+              <a:rPr lang="bg-BG" dirty="0" smtClean="0"/>
+              <a:t>Запис на текущи стойности на възлите</a:t>
             </a:r>
             <a:endParaRPr lang="bg-BG" dirty="0"/>
           </a:p>
@@ -3404,23 +3669,1156 @@
       </p:sp>
       <p:sp>
         <p:nvSpPr>
-          <p:cNvPr id="3" name="Content Placeholder 2"/>
-          <p:cNvSpPr>
-            <a:spLocks noGrp="1"/>
-          </p:cNvSpPr>
-          <p:nvPr>
-            <p:ph idx="1"/>
+          <p:cNvPr id="5" name="TextBox 4"/>
+          <p:cNvSpPr txBox="1"/>
+          <p:nvPr/>
+        </p:nvSpPr>
+        <p:spPr>
+          <a:xfrm>
+            <a:off x="143289" y="1484784"/>
+            <a:ext cx="4500719" cy="1754326"/>
+          </a:xfrm>
+          <a:prstGeom prst="rect">
+            <a:avLst/>
+          </a:prstGeom>
+          <a:noFill/>
+        </p:spPr>
+        <p:txBody>
+          <a:bodyPr wrap="none" rtlCol="0">
+            <a:spAutoFit/>
+          </a:bodyPr>
+          <a:lstStyle/>
+          <a:p>
+            <a:r>
+              <a:rPr lang="bg-BG" b="1" dirty="0" smtClean="0"/>
+              <a:t>Клиент</a:t>
+            </a:r>
+          </a:p>
+          <a:p>
+            <a:pPr>
+              <a:buFont typeface="Arial" pitchFamily="34" charset="0"/>
+              <a:buChar char="•"/>
+            </a:pPr>
+            <a:r>
+              <a:rPr lang="bg-BG" dirty="0" smtClean="0"/>
+              <a:t> Достъпва </a:t>
+            </a:r>
+            <a:r>
+              <a:rPr lang="en-US" dirty="0" smtClean="0"/>
+              <a:t>WEB </a:t>
+            </a:r>
+            <a:r>
+              <a:rPr lang="bg-BG" dirty="0" smtClean="0"/>
+              <a:t>услугата</a:t>
+            </a:r>
+          </a:p>
+          <a:p>
+            <a:pPr>
+              <a:buFont typeface="Arial" pitchFamily="34" charset="0"/>
+              <a:buChar char="•"/>
+            </a:pPr>
+            <a:r>
+              <a:rPr lang="bg-BG" dirty="0" smtClean="0"/>
+              <a:t> </a:t>
+            </a:r>
+            <a:r>
+              <a:rPr lang="bg-BG" dirty="0" smtClean="0"/>
+              <a:t>Графично представяне на дървото</a:t>
+            </a:r>
+          </a:p>
+          <a:p>
+            <a:pPr>
+              <a:buFont typeface="Arial" pitchFamily="34" charset="0"/>
+              <a:buChar char="•"/>
+            </a:pPr>
+            <a:r>
+              <a:rPr lang="bg-BG" dirty="0" smtClean="0"/>
+              <a:t> </a:t>
+            </a:r>
+            <a:r>
+              <a:rPr lang="bg-BG" dirty="0" smtClean="0"/>
+              <a:t>Селекция на симулационен цикъл</a:t>
+            </a:r>
+          </a:p>
+          <a:p>
+            <a:pPr>
+              <a:buFont typeface="Arial" pitchFamily="34" charset="0"/>
+              <a:buChar char="•"/>
+            </a:pPr>
+            <a:r>
+              <a:rPr lang="bg-BG" dirty="0" smtClean="0"/>
+              <a:t> </a:t>
+            </a:r>
+            <a:r>
+              <a:rPr lang="bg-BG" dirty="0" smtClean="0"/>
+              <a:t>Постъпково възстановяване на дървото</a:t>
+            </a:r>
+          </a:p>
+          <a:p>
+            <a:pPr>
+              <a:buFont typeface="Arial" pitchFamily="34" charset="0"/>
+              <a:buChar char="•"/>
+            </a:pPr>
+            <a:r>
+              <a:rPr lang="bg-BG" dirty="0" smtClean="0"/>
+              <a:t> </a:t>
+            </a:r>
+            <a:r>
+              <a:rPr lang="bg-BG" dirty="0" smtClean="0"/>
+              <a:t>Статистическа информация за всеки възел</a:t>
+            </a:r>
+            <a:endParaRPr lang="bg-BG" dirty="0"/>
+          </a:p>
+        </p:txBody>
+      </p:sp>
+    </p:spTree>
+  </p:cSld>
+  <p:clrMapOvr>
+    <a:masterClrMapping/>
+  </p:clrMapOvr>
+</p:sld>
+</file>
+
+<file path=ppt/slides/slide6.xml><?xml version="1.0" encoding="utf-8"?>
+<p:sld xmlns:a="http://schemas.openxmlformats.org/drawingml/2006/main" xmlns:r="http://schemas.openxmlformats.org/officeDocument/2006/relationships" xmlns:p="http://schemas.openxmlformats.org/presentationml/2006/main">
+  <p:cSld>
+    <p:spTree>
+      <p:nvGrpSpPr>
+        <p:cNvPr id="1" name=""/>
+        <p:cNvGrpSpPr/>
+        <p:nvPr/>
+      </p:nvGrpSpPr>
+      <p:grpSpPr>
+        <a:xfrm>
+          <a:off x="0" y="0"/>
+          <a:ext cx="0" cy="0"/>
+          <a:chOff x="0" y="0"/>
+          <a:chExt cx="0" cy="0"/>
+        </a:xfrm>
+      </p:grpSpPr>
+      <p:sp>
+        <p:nvSpPr>
+          <p:cNvPr id="2" name="Title 1"/>
+          <p:cNvSpPr>
+            <a:spLocks noGrp="1"/>
+          </p:cNvSpPr>
+          <p:nvPr>
+            <p:ph type="title"/>
           </p:nvPr>
         </p:nvSpPr>
         <p:spPr/>
         <p:txBody>
-          <a:bodyPr/>
-          <a:lstStyle/>
-          <a:p>
-            <a:endParaRPr lang="bg-BG"/>
-          </a:p>
-        </p:txBody>
-      </p:sp>
+          <a:bodyPr>
+            <a:normAutofit/>
+          </a:bodyPr>
+          <a:lstStyle/>
+          <a:p>
+            <a:r>
+              <a:rPr lang="bg-BG" sz="3600" dirty="0" smtClean="0"/>
+              <a:t>Използвани технологии</a:t>
+            </a:r>
+            <a:endParaRPr lang="bg-BG" sz="3600" dirty="0"/>
+          </a:p>
+        </p:txBody>
+      </p:sp>
+      <p:pic>
+        <p:nvPicPr>
+          <p:cNvPr id="1026" name="Picture 2" descr="https://upload.wikimedia.org/wikipedia/en/8/88/Java_logo.png"/>
+          <p:cNvPicPr>
+            <a:picLocks noChangeAspect="1" noChangeArrowheads="1"/>
+          </p:cNvPicPr>
+          <p:nvPr/>
+        </p:nvPicPr>
+        <p:blipFill>
+          <a:blip r:embed="rId2" cstate="print"/>
+          <a:srcRect/>
+          <a:stretch>
+            <a:fillRect/>
+          </a:stretch>
+        </p:blipFill>
+        <p:spPr bwMode="auto">
+          <a:xfrm>
+            <a:off x="3275856" y="1268760"/>
+            <a:ext cx="936104" cy="936104"/>
+          </a:xfrm>
+          <a:prstGeom prst="rect">
+            <a:avLst/>
+          </a:prstGeom>
+          <a:noFill/>
+        </p:spPr>
+      </p:pic>
+      <p:pic>
+        <p:nvPicPr>
+          <p:cNvPr id="1028" name="Picture 4" descr="http://1.bp.blogspot.com/-rh7d8bjyCXA/VYEpRQ9cLGI/AAAAAAAAFIY/wxG92yvhGQc/s1600/netbeans-logo.png"/>
+          <p:cNvPicPr>
+            <a:picLocks noChangeAspect="1" noChangeArrowheads="1"/>
+          </p:cNvPicPr>
+          <p:nvPr/>
+        </p:nvPicPr>
+        <p:blipFill>
+          <a:blip r:embed="rId3" cstate="print"/>
+          <a:srcRect/>
+          <a:stretch>
+            <a:fillRect/>
+          </a:stretch>
+        </p:blipFill>
+        <p:spPr bwMode="auto">
+          <a:xfrm>
+            <a:off x="3491880" y="2154939"/>
+            <a:ext cx="1440160" cy="627270"/>
+          </a:xfrm>
+          <a:prstGeom prst="rect">
+            <a:avLst/>
+          </a:prstGeom>
+          <a:noFill/>
+        </p:spPr>
+      </p:pic>
+      <p:pic>
+        <p:nvPicPr>
+          <p:cNvPr id="1030" name="Picture 6" descr="https://avatars1.githubusercontent.com/u/874086?v=3&amp;s=400"/>
+          <p:cNvPicPr>
+            <a:picLocks noChangeAspect="1" noChangeArrowheads="1"/>
+          </p:cNvPicPr>
+          <p:nvPr/>
+        </p:nvPicPr>
+        <p:blipFill>
+          <a:blip r:embed="rId4" cstate="print"/>
+          <a:srcRect/>
+          <a:stretch>
+            <a:fillRect/>
+          </a:stretch>
+        </p:blipFill>
+        <p:spPr bwMode="auto">
+          <a:xfrm>
+            <a:off x="3491880" y="2492896"/>
+            <a:ext cx="1008112" cy="1008112"/>
+          </a:xfrm>
+          <a:prstGeom prst="rect">
+            <a:avLst/>
+          </a:prstGeom>
+          <a:noFill/>
+        </p:spPr>
+      </p:pic>
+      <p:pic>
+        <p:nvPicPr>
+          <p:cNvPr id="1032" name="Picture 8" descr="https://git-scm.com/images/logo@2x.png"/>
+          <p:cNvPicPr>
+            <a:picLocks noChangeAspect="1" noChangeArrowheads="1"/>
+          </p:cNvPicPr>
+          <p:nvPr/>
+        </p:nvPicPr>
+        <p:blipFill>
+          <a:blip r:embed="rId5" cstate="print"/>
+          <a:srcRect/>
+          <a:stretch>
+            <a:fillRect/>
+          </a:stretch>
+        </p:blipFill>
+        <p:spPr bwMode="auto">
+          <a:xfrm>
+            <a:off x="3491880" y="3284984"/>
+            <a:ext cx="1080120" cy="451687"/>
+          </a:xfrm>
+          <a:prstGeom prst="rect">
+            <a:avLst/>
+          </a:prstGeom>
+          <a:noFill/>
+        </p:spPr>
+      </p:pic>
+      <p:pic>
+        <p:nvPicPr>
+          <p:cNvPr id="1034" name="Picture 10" descr="https://maven.apache.org/images/maven-logo-black-on-white.png"/>
+          <p:cNvPicPr>
+            <a:picLocks noChangeAspect="1" noChangeArrowheads="1"/>
+          </p:cNvPicPr>
+          <p:nvPr/>
+        </p:nvPicPr>
+        <p:blipFill>
+          <a:blip r:embed="rId6" cstate="print"/>
+          <a:srcRect/>
+          <a:stretch>
+            <a:fillRect/>
+          </a:stretch>
+        </p:blipFill>
+        <p:spPr bwMode="auto">
+          <a:xfrm>
+            <a:off x="3491880" y="3861048"/>
+            <a:ext cx="1584176" cy="400704"/>
+          </a:xfrm>
+          <a:prstGeom prst="rect">
+            <a:avLst/>
+          </a:prstGeom>
+          <a:noFill/>
+        </p:spPr>
+      </p:pic>
+      <p:pic>
+        <p:nvPicPr>
+          <p:cNvPr id="1036" name="Picture 12" descr="http://f.tqn.com/y/pcsupport/1/0/h/Y/-/-/xml-file.png"/>
+          <p:cNvPicPr>
+            <a:picLocks noChangeAspect="1" noChangeArrowheads="1"/>
+          </p:cNvPicPr>
+          <p:nvPr/>
+        </p:nvPicPr>
+        <p:blipFill>
+          <a:blip r:embed="rId7" cstate="print"/>
+          <a:srcRect/>
+          <a:stretch>
+            <a:fillRect/>
+          </a:stretch>
+        </p:blipFill>
+        <p:spPr bwMode="auto">
+          <a:xfrm>
+            <a:off x="3491880" y="4365104"/>
+            <a:ext cx="1008112" cy="1008113"/>
+          </a:xfrm>
+          <a:prstGeom prst="rect">
+            <a:avLst/>
+          </a:prstGeom>
+          <a:noFill/>
+        </p:spPr>
+      </p:pic>
+      <p:pic>
+        <p:nvPicPr>
+          <p:cNvPr id="1040" name="Picture 16" descr="https://upload.wikimedia.org/wikipedia/en/2/2d/UML_logo.gif"/>
+          <p:cNvPicPr>
+            <a:picLocks noChangeAspect="1" noChangeArrowheads="1"/>
+          </p:cNvPicPr>
+          <p:nvPr/>
+        </p:nvPicPr>
+        <p:blipFill>
+          <a:blip r:embed="rId8" cstate="print"/>
+          <a:srcRect/>
+          <a:stretch>
+            <a:fillRect/>
+          </a:stretch>
+        </p:blipFill>
+        <p:spPr bwMode="auto">
+          <a:xfrm>
+            <a:off x="3491880" y="5424406"/>
+            <a:ext cx="1440160" cy="1023787"/>
+          </a:xfrm>
+          <a:prstGeom prst="rect">
+            <a:avLst/>
+          </a:prstGeom>
+          <a:noFill/>
+        </p:spPr>
+      </p:pic>
+      <p:sp>
+        <p:nvSpPr>
+          <p:cNvPr id="11" name="TextBox 10"/>
+          <p:cNvSpPr txBox="1"/>
+          <p:nvPr/>
+        </p:nvSpPr>
+        <p:spPr>
+          <a:xfrm>
+            <a:off x="2195736" y="1700808"/>
+            <a:ext cx="1220591" cy="4801314"/>
+          </a:xfrm>
+          <a:prstGeom prst="rect">
+            <a:avLst/>
+          </a:prstGeom>
+          <a:noFill/>
+        </p:spPr>
+        <p:txBody>
+          <a:bodyPr wrap="none" rtlCol="0">
+            <a:spAutoFit/>
+          </a:bodyPr>
+          <a:lstStyle/>
+          <a:p>
+            <a:pPr>
+              <a:buFont typeface="Arial" pitchFamily="34" charset="0"/>
+              <a:buChar char="•"/>
+            </a:pPr>
+            <a:r>
+              <a:rPr lang="en-US" dirty="0" smtClean="0"/>
+              <a:t> Java</a:t>
+            </a:r>
+          </a:p>
+          <a:p>
+            <a:endParaRPr lang="en-US" dirty="0" smtClean="0"/>
+          </a:p>
+          <a:p>
+            <a:pPr>
+              <a:buFont typeface="Arial" pitchFamily="34" charset="0"/>
+              <a:buChar char="•"/>
+            </a:pPr>
+            <a:r>
+              <a:rPr lang="en-US" dirty="0" smtClean="0"/>
+              <a:t> </a:t>
+            </a:r>
+            <a:r>
+              <a:rPr lang="en-US" dirty="0" smtClean="0"/>
+              <a:t>NetBeans</a:t>
+            </a:r>
+          </a:p>
+          <a:p>
+            <a:endParaRPr lang="en-US" dirty="0" smtClean="0"/>
+          </a:p>
+          <a:p>
+            <a:pPr>
+              <a:buFont typeface="Arial" pitchFamily="34" charset="0"/>
+              <a:buChar char="•"/>
+            </a:pPr>
+            <a:r>
+              <a:rPr lang="en-US" dirty="0" smtClean="0"/>
+              <a:t> </a:t>
+            </a:r>
+            <a:r>
+              <a:rPr lang="en-US" dirty="0" smtClean="0"/>
+              <a:t>JUnit</a:t>
+            </a:r>
+          </a:p>
+          <a:p>
+            <a:endParaRPr lang="en-US" dirty="0" smtClean="0"/>
+          </a:p>
+          <a:p>
+            <a:pPr>
+              <a:buFont typeface="Arial" pitchFamily="34" charset="0"/>
+              <a:buChar char="•"/>
+            </a:pPr>
+            <a:r>
+              <a:rPr lang="en-US" dirty="0" smtClean="0"/>
+              <a:t> </a:t>
+            </a:r>
+            <a:r>
+              <a:rPr lang="en-US" dirty="0" smtClean="0"/>
+              <a:t>Git</a:t>
+            </a:r>
+          </a:p>
+          <a:p>
+            <a:endParaRPr lang="en-US" dirty="0" smtClean="0"/>
+          </a:p>
+          <a:p>
+            <a:pPr>
+              <a:buFont typeface="Arial" pitchFamily="34" charset="0"/>
+              <a:buChar char="•"/>
+            </a:pPr>
+            <a:r>
+              <a:rPr lang="en-US" dirty="0" smtClean="0"/>
+              <a:t> </a:t>
+            </a:r>
+            <a:r>
+              <a:rPr lang="en-US" dirty="0" smtClean="0"/>
+              <a:t>Maven</a:t>
+            </a:r>
+          </a:p>
+          <a:p>
+            <a:endParaRPr lang="en-US" dirty="0" smtClean="0"/>
+          </a:p>
+          <a:p>
+            <a:pPr>
+              <a:buFont typeface="Arial" pitchFamily="34" charset="0"/>
+              <a:buChar char="•"/>
+            </a:pPr>
+            <a:r>
+              <a:rPr lang="en-US" dirty="0" smtClean="0"/>
+              <a:t> </a:t>
+            </a:r>
+            <a:r>
+              <a:rPr lang="en-US" dirty="0" smtClean="0"/>
+              <a:t>XML</a:t>
+            </a:r>
+          </a:p>
+          <a:p>
+            <a:endParaRPr lang="en-US" dirty="0" smtClean="0"/>
+          </a:p>
+          <a:p>
+            <a:pPr>
+              <a:buFont typeface="Arial" pitchFamily="34" charset="0"/>
+              <a:buChar char="•"/>
+            </a:pPr>
+            <a:r>
+              <a:rPr lang="en-US" dirty="0" smtClean="0"/>
+              <a:t> </a:t>
+            </a:r>
+            <a:r>
+              <a:rPr lang="en-US" dirty="0" smtClean="0"/>
+              <a:t>JAXB</a:t>
+            </a:r>
+          </a:p>
+          <a:p>
+            <a:endParaRPr lang="en-US" dirty="0" smtClean="0"/>
+          </a:p>
+          <a:p>
+            <a:pPr>
+              <a:buFont typeface="Arial" pitchFamily="34" charset="0"/>
+              <a:buChar char="•"/>
+            </a:pPr>
+            <a:r>
+              <a:rPr lang="en-US" dirty="0" smtClean="0"/>
+              <a:t> </a:t>
+            </a:r>
+            <a:r>
+              <a:rPr lang="en-US" dirty="0" smtClean="0"/>
+              <a:t>Swing</a:t>
+            </a:r>
+          </a:p>
+          <a:p>
+            <a:endParaRPr lang="en-US" dirty="0" smtClean="0"/>
+          </a:p>
+          <a:p>
+            <a:pPr>
+              <a:buFont typeface="Arial" pitchFamily="34" charset="0"/>
+              <a:buChar char="•"/>
+            </a:pPr>
+            <a:r>
+              <a:rPr lang="en-US" dirty="0" smtClean="0"/>
+              <a:t> </a:t>
+            </a:r>
+            <a:r>
+              <a:rPr lang="en-US" dirty="0" smtClean="0"/>
+              <a:t>UML</a:t>
+            </a:r>
+            <a:endParaRPr lang="bg-BG" dirty="0"/>
+          </a:p>
+        </p:txBody>
+      </p:sp>
+    </p:spTree>
+  </p:cSld>
+  <p:clrMapOvr>
+    <a:masterClrMapping/>
+  </p:clrMapOvr>
+</p:sld>
+</file>
+
+<file path=ppt/slides/slide7.xml><?xml version="1.0" encoding="utf-8"?>
+<p:sld xmlns:a="http://schemas.openxmlformats.org/drawingml/2006/main" xmlns:r="http://schemas.openxmlformats.org/officeDocument/2006/relationships" xmlns:p="http://schemas.openxmlformats.org/presentationml/2006/main">
+  <p:cSld>
+    <p:spTree>
+      <p:nvGrpSpPr>
+        <p:cNvPr id="1" name=""/>
+        <p:cNvGrpSpPr/>
+        <p:nvPr/>
+      </p:nvGrpSpPr>
+      <p:grpSpPr>
+        <a:xfrm>
+          <a:off x="0" y="0"/>
+          <a:ext cx="0" cy="0"/>
+          <a:chOff x="0" y="0"/>
+          <a:chExt cx="0" cy="0"/>
+        </a:xfrm>
+      </p:grpSpPr>
+      <p:sp>
+        <p:nvSpPr>
+          <p:cNvPr id="2" name="Title 1"/>
+          <p:cNvSpPr>
+            <a:spLocks noGrp="1"/>
+          </p:cNvSpPr>
+          <p:nvPr>
+            <p:ph type="title"/>
+          </p:nvPr>
+        </p:nvSpPr>
+        <p:spPr/>
+        <p:txBody>
+          <a:bodyPr>
+            <a:normAutofit/>
+          </a:bodyPr>
+          <a:lstStyle/>
+          <a:p>
+            <a:r>
+              <a:rPr lang="bg-BG" sz="3600" dirty="0" smtClean="0"/>
+              <a:t>Операционни възли и променливи</a:t>
+            </a:r>
+            <a:endParaRPr lang="bg-BG" sz="3600" dirty="0"/>
+          </a:p>
+        </p:txBody>
+      </p:sp>
+      <p:sp>
+        <p:nvSpPr>
+          <p:cNvPr id="3" name="TextBox 2"/>
+          <p:cNvSpPr txBox="1"/>
+          <p:nvPr/>
+        </p:nvSpPr>
+        <p:spPr>
+          <a:xfrm>
+            <a:off x="1043608" y="4653136"/>
+            <a:ext cx="1824410" cy="1477328"/>
+          </a:xfrm>
+          <a:prstGeom prst="rect">
+            <a:avLst/>
+          </a:prstGeom>
+          <a:noFill/>
+        </p:spPr>
+        <p:txBody>
+          <a:bodyPr wrap="none" rtlCol="0">
+            <a:spAutoFit/>
+          </a:bodyPr>
+          <a:lstStyle/>
+          <a:p>
+            <a:r>
+              <a:rPr lang="bg-BG" b="1" dirty="0" smtClean="0"/>
+              <a:t>Двуаргументни</a:t>
+            </a:r>
+          </a:p>
+          <a:p>
+            <a:pPr>
+              <a:buFont typeface="Arial" pitchFamily="34" charset="0"/>
+              <a:buChar char="•"/>
+            </a:pPr>
+            <a:r>
+              <a:rPr lang="bg-BG" dirty="0" smtClean="0"/>
+              <a:t> </a:t>
+            </a:r>
+            <a:r>
+              <a:rPr lang="bg-BG" dirty="0" smtClean="0"/>
+              <a:t>Деление</a:t>
+            </a:r>
+          </a:p>
+          <a:p>
+            <a:pPr>
+              <a:buFont typeface="Arial" pitchFamily="34" charset="0"/>
+              <a:buChar char="•"/>
+            </a:pPr>
+            <a:r>
+              <a:rPr lang="bg-BG" dirty="0" smtClean="0"/>
+              <a:t> </a:t>
+            </a:r>
+            <a:r>
+              <a:rPr lang="bg-BG" dirty="0" smtClean="0"/>
+              <a:t>Степенуване</a:t>
+            </a:r>
+          </a:p>
+          <a:p>
+            <a:pPr>
+              <a:buFont typeface="Arial" pitchFamily="34" charset="0"/>
+              <a:buChar char="•"/>
+            </a:pPr>
+            <a:r>
+              <a:rPr lang="bg-BG" dirty="0" smtClean="0"/>
+              <a:t> </a:t>
+            </a:r>
+            <a:r>
+              <a:rPr lang="bg-BG" dirty="0" smtClean="0"/>
+              <a:t>Логаритмуване</a:t>
+            </a:r>
+          </a:p>
+          <a:p>
+            <a:pPr>
+              <a:buFont typeface="Arial" pitchFamily="34" charset="0"/>
+              <a:buChar char="•"/>
+            </a:pPr>
+            <a:r>
+              <a:rPr lang="bg-BG" dirty="0" smtClean="0"/>
+              <a:t> </a:t>
+            </a:r>
+            <a:r>
+              <a:rPr lang="bg-BG" dirty="0" smtClean="0"/>
+              <a:t>Коренуване</a:t>
+            </a:r>
+            <a:endParaRPr lang="bg-BG" dirty="0"/>
+          </a:p>
+        </p:txBody>
+      </p:sp>
+      <p:sp>
+        <p:nvSpPr>
+          <p:cNvPr id="4" name="TextBox 3"/>
+          <p:cNvSpPr txBox="1"/>
+          <p:nvPr/>
+        </p:nvSpPr>
+        <p:spPr>
+          <a:xfrm>
+            <a:off x="1043608" y="1628800"/>
+            <a:ext cx="3920882" cy="2308324"/>
+          </a:xfrm>
+          <a:prstGeom prst="rect">
+            <a:avLst/>
+          </a:prstGeom>
+          <a:noFill/>
+        </p:spPr>
+        <p:txBody>
+          <a:bodyPr wrap="none" rtlCol="0">
+            <a:spAutoFit/>
+          </a:bodyPr>
+          <a:lstStyle/>
+          <a:p>
+            <a:r>
+              <a:rPr lang="bg-BG" b="1" dirty="0" smtClean="0"/>
+              <a:t>Безаргументни</a:t>
+            </a:r>
+          </a:p>
+          <a:p>
+            <a:pPr>
+              <a:buFont typeface="Arial" pitchFamily="34" charset="0"/>
+              <a:buChar char="•"/>
+            </a:pPr>
+            <a:r>
+              <a:rPr lang="bg-BG" dirty="0" smtClean="0"/>
+              <a:t> </a:t>
+            </a:r>
+            <a:r>
+              <a:rPr lang="bg-BG" dirty="0" smtClean="0"/>
+              <a:t>Константа</a:t>
+            </a:r>
+          </a:p>
+          <a:p>
+            <a:pPr>
+              <a:buFont typeface="Arial" pitchFamily="34" charset="0"/>
+              <a:buChar char="•"/>
+            </a:pPr>
+            <a:r>
+              <a:rPr lang="bg-BG" dirty="0" smtClean="0"/>
+              <a:t> </a:t>
+            </a:r>
+            <a:r>
+              <a:rPr lang="bg-BG" dirty="0" smtClean="0"/>
+              <a:t>Стохастична променлива</a:t>
+            </a:r>
+          </a:p>
+          <a:p>
+            <a:pPr lvl="1">
+              <a:buFont typeface="Courier New" pitchFamily="49" charset="0"/>
+              <a:buChar char="o"/>
+            </a:pPr>
+            <a:r>
+              <a:rPr lang="bg-BG" dirty="0" smtClean="0"/>
+              <a:t> </a:t>
+            </a:r>
+            <a:r>
+              <a:rPr lang="bg-BG" dirty="0" smtClean="0"/>
+              <a:t>Равномерно разпределена</a:t>
+            </a:r>
+          </a:p>
+          <a:p>
+            <a:pPr lvl="1">
+              <a:buFont typeface="Courier New" pitchFamily="49" charset="0"/>
+              <a:buChar char="o"/>
+            </a:pPr>
+            <a:r>
+              <a:rPr lang="bg-BG" dirty="0" smtClean="0"/>
+              <a:t> </a:t>
+            </a:r>
+            <a:r>
+              <a:rPr lang="bg-BG" dirty="0" smtClean="0"/>
+              <a:t>Нормално разпределена</a:t>
+            </a:r>
+          </a:p>
+          <a:p>
+            <a:pPr lvl="1">
+              <a:buFont typeface="Courier New" pitchFamily="49" charset="0"/>
+              <a:buChar char="o"/>
+            </a:pPr>
+            <a:r>
+              <a:rPr lang="bg-BG" dirty="0" smtClean="0"/>
+              <a:t> Логнормално разпределена</a:t>
+            </a:r>
+          </a:p>
+          <a:p>
+            <a:pPr lvl="1">
+              <a:buFont typeface="Courier New" pitchFamily="49" charset="0"/>
+              <a:buChar char="o"/>
+            </a:pPr>
+            <a:r>
+              <a:rPr lang="bg-BG" dirty="0" smtClean="0"/>
+              <a:t> </a:t>
+            </a:r>
+            <a:r>
+              <a:rPr lang="bg-BG" dirty="0" smtClean="0"/>
+              <a:t>Гама разпределена</a:t>
+            </a:r>
+          </a:p>
+          <a:p>
+            <a:pPr lvl="1">
+              <a:buFont typeface="Courier New" pitchFamily="49" charset="0"/>
+              <a:buChar char="o"/>
+            </a:pPr>
+            <a:r>
+              <a:rPr lang="bg-BG" dirty="0" smtClean="0"/>
+              <a:t> Експоненциално разпределена</a:t>
+            </a:r>
+            <a:endParaRPr lang="bg-BG" dirty="0"/>
+          </a:p>
+        </p:txBody>
+      </p:sp>
+      <p:sp>
+        <p:nvSpPr>
+          <p:cNvPr id="5" name="TextBox 4"/>
+          <p:cNvSpPr txBox="1"/>
+          <p:nvPr/>
+        </p:nvSpPr>
+        <p:spPr>
+          <a:xfrm>
+            <a:off x="5483552" y="4376138"/>
+            <a:ext cx="2487925" cy="1754326"/>
+          </a:xfrm>
+          <a:prstGeom prst="rect">
+            <a:avLst/>
+          </a:prstGeom>
+          <a:noFill/>
+        </p:spPr>
+        <p:txBody>
+          <a:bodyPr wrap="none" rtlCol="0">
+            <a:spAutoFit/>
+          </a:bodyPr>
+          <a:lstStyle/>
+          <a:p>
+            <a:r>
+              <a:rPr lang="bg-BG" b="1" dirty="0" smtClean="0"/>
+              <a:t>Многоаргументни</a:t>
+            </a:r>
+          </a:p>
+          <a:p>
+            <a:pPr>
+              <a:buFont typeface="Arial" pitchFamily="34" charset="0"/>
+              <a:buChar char="•"/>
+            </a:pPr>
+            <a:r>
+              <a:rPr lang="bg-BG" dirty="0" smtClean="0"/>
+              <a:t> Средна стойност</a:t>
+            </a:r>
+          </a:p>
+          <a:p>
+            <a:pPr>
+              <a:buFont typeface="Arial" pitchFamily="34" charset="0"/>
+              <a:buChar char="•"/>
+            </a:pPr>
+            <a:r>
+              <a:rPr lang="bg-BG" dirty="0" smtClean="0"/>
+              <a:t> </a:t>
+            </a:r>
+            <a:r>
+              <a:rPr lang="bg-BG" dirty="0" smtClean="0"/>
+              <a:t>Минимална стойност</a:t>
+            </a:r>
+          </a:p>
+          <a:p>
+            <a:pPr>
+              <a:buFont typeface="Arial" pitchFamily="34" charset="0"/>
+              <a:buChar char="•"/>
+            </a:pPr>
+            <a:r>
+              <a:rPr lang="bg-BG" dirty="0" smtClean="0"/>
+              <a:t> </a:t>
+            </a:r>
+            <a:r>
+              <a:rPr lang="bg-BG" dirty="0" smtClean="0"/>
+              <a:t>Максимална стойност</a:t>
+            </a:r>
+          </a:p>
+          <a:p>
+            <a:pPr>
+              <a:buFont typeface="Arial" pitchFamily="34" charset="0"/>
+              <a:buChar char="•"/>
+            </a:pPr>
+            <a:r>
+              <a:rPr lang="bg-BG" dirty="0" smtClean="0"/>
+              <a:t> </a:t>
+            </a:r>
+            <a:r>
+              <a:rPr lang="bg-BG" dirty="0" smtClean="0"/>
+              <a:t>Сума</a:t>
+            </a:r>
+          </a:p>
+          <a:p>
+            <a:pPr>
+              <a:buFont typeface="Arial" pitchFamily="34" charset="0"/>
+              <a:buChar char="•"/>
+            </a:pPr>
+            <a:r>
+              <a:rPr lang="bg-BG" dirty="0" smtClean="0"/>
+              <a:t> </a:t>
+            </a:r>
+            <a:r>
+              <a:rPr lang="bg-BG" dirty="0" smtClean="0"/>
+              <a:t>Произведение</a:t>
+            </a:r>
+            <a:endParaRPr lang="bg-BG" dirty="0"/>
+          </a:p>
+        </p:txBody>
+      </p:sp>
+      <p:sp>
+        <p:nvSpPr>
+          <p:cNvPr id="6" name="TextBox 5"/>
+          <p:cNvSpPr txBox="1"/>
+          <p:nvPr/>
+        </p:nvSpPr>
+        <p:spPr>
+          <a:xfrm>
+            <a:off x="5940152" y="1628800"/>
+            <a:ext cx="2031325" cy="2031325"/>
+          </a:xfrm>
+          <a:prstGeom prst="rect">
+            <a:avLst/>
+          </a:prstGeom>
+          <a:noFill/>
+        </p:spPr>
+        <p:txBody>
+          <a:bodyPr wrap="none" rtlCol="0">
+            <a:spAutoFit/>
+          </a:bodyPr>
+          <a:lstStyle/>
+          <a:p>
+            <a:r>
+              <a:rPr lang="bg-BG" b="1" dirty="0" smtClean="0"/>
+              <a:t>Едноаргументни</a:t>
+            </a:r>
+          </a:p>
+          <a:p>
+            <a:pPr>
+              <a:buFont typeface="Arial" pitchFamily="34" charset="0"/>
+              <a:buChar char="•"/>
+            </a:pPr>
+            <a:r>
+              <a:rPr lang="bg-BG" dirty="0" smtClean="0"/>
+              <a:t> </a:t>
+            </a:r>
+            <a:r>
+              <a:rPr lang="bg-BG" dirty="0" smtClean="0"/>
+              <a:t>Модул</a:t>
+            </a:r>
+          </a:p>
+          <a:p>
+            <a:pPr>
+              <a:buFont typeface="Arial" pitchFamily="34" charset="0"/>
+              <a:buChar char="•"/>
+            </a:pPr>
+            <a:r>
+              <a:rPr lang="bg-BG" dirty="0" smtClean="0"/>
+              <a:t> </a:t>
+            </a:r>
+            <a:r>
+              <a:rPr lang="bg-BG" dirty="0" smtClean="0"/>
+              <a:t>Косинус</a:t>
+            </a:r>
+          </a:p>
+          <a:p>
+            <a:pPr>
+              <a:buFont typeface="Arial" pitchFamily="34" charset="0"/>
+              <a:buChar char="•"/>
+            </a:pPr>
+            <a:r>
+              <a:rPr lang="bg-BG" dirty="0" smtClean="0"/>
+              <a:t> </a:t>
+            </a:r>
+            <a:r>
+              <a:rPr lang="bg-BG" dirty="0" smtClean="0"/>
+              <a:t>Котангент</a:t>
+            </a:r>
+          </a:p>
+          <a:p>
+            <a:pPr>
+              <a:buFont typeface="Arial" pitchFamily="34" charset="0"/>
+              <a:buChar char="•"/>
+            </a:pPr>
+            <a:r>
+              <a:rPr lang="bg-BG" dirty="0" smtClean="0"/>
+              <a:t> </a:t>
+            </a:r>
+            <a:r>
+              <a:rPr lang="bg-BG" dirty="0" smtClean="0"/>
+              <a:t>Отрицание</a:t>
+            </a:r>
+          </a:p>
+          <a:p>
+            <a:pPr>
+              <a:buFont typeface="Arial" pitchFamily="34" charset="0"/>
+              <a:buChar char="•"/>
+            </a:pPr>
+            <a:r>
+              <a:rPr lang="bg-BG" dirty="0" smtClean="0"/>
+              <a:t> </a:t>
+            </a:r>
+            <a:r>
+              <a:rPr lang="bg-BG" dirty="0" smtClean="0"/>
+              <a:t>Синус</a:t>
+            </a:r>
+          </a:p>
+          <a:p>
+            <a:pPr>
+              <a:buFont typeface="Arial" pitchFamily="34" charset="0"/>
+              <a:buChar char="•"/>
+            </a:pPr>
+            <a:r>
+              <a:rPr lang="bg-BG" dirty="0" smtClean="0"/>
+              <a:t> </a:t>
+            </a:r>
+            <a:r>
+              <a:rPr lang="bg-BG" dirty="0" smtClean="0"/>
+              <a:t>Тангенс		</a:t>
+            </a:r>
+            <a:endParaRPr lang="bg-BG" dirty="0"/>
+          </a:p>
+        </p:txBody>
+      </p:sp>
+    </p:spTree>
+  </p:cSld>
+  <p:clrMapOvr>
+    <a:masterClrMapping/>
+  </p:clrMapOvr>
+</p:sld>
+</file>
+
+<file path=ppt/slides/slide8.xml><?xml version="1.0" encoding="utf-8"?>
+<p:sld xmlns:a="http://schemas.openxmlformats.org/drawingml/2006/main" xmlns:r="http://schemas.openxmlformats.org/officeDocument/2006/relationships" xmlns:p="http://schemas.openxmlformats.org/presentationml/2006/main">
+  <p:cSld>
+    <p:spTree>
+      <p:nvGrpSpPr>
+        <p:cNvPr id="1" name=""/>
+        <p:cNvGrpSpPr/>
+        <p:nvPr/>
+      </p:nvGrpSpPr>
+      <p:grpSpPr>
+        <a:xfrm>
+          <a:off x="0" y="0"/>
+          <a:ext cx="0" cy="0"/>
+          <a:chOff x="0" y="0"/>
+          <a:chExt cx="0" cy="0"/>
+        </a:xfrm>
+      </p:grpSpPr>
+      <p:pic>
+        <p:nvPicPr>
+          <p:cNvPr id="6" name="Picture 5" descr="Example simulation request first half.png"/>
+          <p:cNvPicPr>
+            <a:picLocks noChangeAspect="1"/>
+          </p:cNvPicPr>
+          <p:nvPr/>
+        </p:nvPicPr>
+        <p:blipFill>
+          <a:blip r:embed="rId2" cstate="print"/>
+          <a:stretch>
+            <a:fillRect/>
+          </a:stretch>
+        </p:blipFill>
+        <p:spPr>
+          <a:xfrm>
+            <a:off x="251520" y="1139303"/>
+            <a:ext cx="4200000" cy="4161905"/>
+          </a:xfrm>
+          <a:prstGeom prst="rect">
+            <a:avLst/>
+          </a:prstGeom>
+        </p:spPr>
+      </p:pic>
+      <p:pic>
+        <p:nvPicPr>
+          <p:cNvPr id="7" name="Picture 6" descr="Example simulation request second half.png"/>
+          <p:cNvPicPr>
+            <a:picLocks noChangeAspect="1"/>
+          </p:cNvPicPr>
+          <p:nvPr/>
+        </p:nvPicPr>
+        <p:blipFill>
+          <a:blip r:embed="rId3" cstate="print"/>
+          <a:stretch>
+            <a:fillRect/>
+          </a:stretch>
+        </p:blipFill>
+        <p:spPr>
+          <a:xfrm>
+            <a:off x="3613266" y="3284225"/>
+            <a:ext cx="5495238" cy="3457143"/>
+          </a:xfrm>
+          <a:prstGeom prst="rect">
+            <a:avLst/>
+          </a:prstGeom>
+        </p:spPr>
+      </p:pic>
+      <p:sp>
+        <p:nvSpPr>
+          <p:cNvPr id="2" name="Title 1"/>
+          <p:cNvSpPr>
+            <a:spLocks noGrp="1"/>
+          </p:cNvSpPr>
+          <p:nvPr>
+            <p:ph type="title"/>
+          </p:nvPr>
+        </p:nvSpPr>
+        <p:spPr/>
+        <p:txBody>
+          <a:bodyPr>
+            <a:normAutofit/>
+          </a:bodyPr>
+          <a:lstStyle/>
+          <a:p>
+            <a:r>
+              <a:rPr lang="bg-BG" sz="3600" dirty="0" smtClean="0"/>
+              <a:t>Симулационна </a:t>
+            </a:r>
+            <a:r>
+              <a:rPr lang="en-US" sz="3600" dirty="0" smtClean="0"/>
+              <a:t>XML </a:t>
+            </a:r>
+            <a:r>
+              <a:rPr lang="bg-BG" sz="3600" dirty="0" smtClean="0"/>
+              <a:t>конфигурация</a:t>
+            </a:r>
+            <a:endParaRPr lang="bg-BG" sz="3600" dirty="0"/>
+          </a:p>
+        </p:txBody>
+      </p:sp>
+    </p:spTree>
+  </p:cSld>
+  <p:clrMapOvr>
+    <a:masterClrMapping/>
+  </p:clrMapOvr>
+</p:sld>
+</file>
+
+<file path=ppt/slides/slide9.xml><?xml version="1.0" encoding="utf-8"?>
+<p:sld xmlns:a="http://schemas.openxmlformats.org/drawingml/2006/main" xmlns:r="http://schemas.openxmlformats.org/officeDocument/2006/relationships" xmlns:p="http://schemas.openxmlformats.org/presentationml/2006/main">
+  <p:cSld>
+    <p:spTree>
+      <p:nvGrpSpPr>
+        <p:cNvPr id="1" name=""/>
+        <p:cNvGrpSpPr/>
+        <p:nvPr/>
+      </p:nvGrpSpPr>
+      <p:grpSpPr>
+        <a:xfrm>
+          <a:off x="0" y="0"/>
+          <a:ext cx="0" cy="0"/>
+          <a:chOff x="0" y="0"/>
+          <a:chExt cx="0" cy="0"/>
+        </a:xfrm>
+      </p:grpSpPr>
+      <p:sp>
+        <p:nvSpPr>
+          <p:cNvPr id="2" name="Title 1"/>
+          <p:cNvSpPr>
+            <a:spLocks noGrp="1"/>
+          </p:cNvSpPr>
+          <p:nvPr>
+            <p:ph type="title"/>
+          </p:nvPr>
+        </p:nvSpPr>
+        <p:spPr/>
+        <p:txBody>
+          <a:bodyPr>
+            <a:normAutofit/>
+          </a:bodyPr>
+          <a:lstStyle/>
+          <a:p>
+            <a:r>
+              <a:rPr lang="bg-BG" sz="3600" dirty="0" smtClean="0"/>
+              <a:t>Оптимизация на симулациите</a:t>
+            </a:r>
+            <a:endParaRPr lang="bg-BG" sz="3600" dirty="0"/>
+          </a:p>
+        </p:txBody>
+      </p:sp>
+      <p:pic>
+        <p:nvPicPr>
+          <p:cNvPr id="3" name="Picture 2" descr="Parallel access.png"/>
+          <p:cNvPicPr>
+            <a:picLocks noChangeAspect="1"/>
+          </p:cNvPicPr>
+          <p:nvPr/>
+        </p:nvPicPr>
+        <p:blipFill>
+          <a:blip r:embed="rId2" cstate="print"/>
+          <a:stretch>
+            <a:fillRect/>
+          </a:stretch>
+        </p:blipFill>
+        <p:spPr>
+          <a:xfrm>
+            <a:off x="602686" y="1467648"/>
+            <a:ext cx="7938628" cy="4624937"/>
+          </a:xfrm>
+          <a:prstGeom prst="rect">
+            <a:avLst/>
+          </a:prstGeom>
+        </p:spPr>
+      </p:pic>
     </p:spTree>
   </p:cSld>
   <p:clrMapOvr>

</xml_diff>

<commit_message>
Last presentation slides added
</commit_message>
<xml_diff>
--- a/documentation/src/main/resources/Monte Carlo Simulation Debugger.pptx
+++ b/documentation/src/main/resources/Monte Carlo Simulation Debugger.pptx
@@ -14,6 +14,10 @@
     <p:sldId id="262" r:id="rId8"/>
     <p:sldId id="266" r:id="rId9"/>
     <p:sldId id="263" r:id="rId10"/>
+    <p:sldId id="267" r:id="rId11"/>
+    <p:sldId id="268" r:id="rId12"/>
+    <p:sldId id="270" r:id="rId13"/>
+    <p:sldId id="273" r:id="rId14"/>
   </p:sldIdLst>
   <p:sldSz cx="9144000" cy="6858000" type="screen4x3"/>
   <p:notesSz cx="6858000" cy="9144000"/>
@@ -3243,6 +3247,538 @@
 </p:sld>
 </file>
 
+<file path=ppt/slides/slide10.xml><?xml version="1.0" encoding="utf-8"?>
+<p:sld xmlns:a="http://schemas.openxmlformats.org/drawingml/2006/main" xmlns:r="http://schemas.openxmlformats.org/officeDocument/2006/relationships" xmlns:p="http://schemas.openxmlformats.org/presentationml/2006/main">
+  <p:cSld>
+    <p:spTree>
+      <p:nvGrpSpPr>
+        <p:cNvPr id="1" name=""/>
+        <p:cNvGrpSpPr/>
+        <p:nvPr/>
+      </p:nvGrpSpPr>
+      <p:grpSpPr>
+        <a:xfrm>
+          <a:off x="0" y="0"/>
+          <a:ext cx="0" cy="0"/>
+          <a:chOff x="0" y="0"/>
+          <a:chExt cx="0" cy="0"/>
+        </a:xfrm>
+      </p:grpSpPr>
+      <p:sp>
+        <p:nvSpPr>
+          <p:cNvPr id="2" name="Title 1"/>
+          <p:cNvSpPr>
+            <a:spLocks noGrp="1"/>
+          </p:cNvSpPr>
+          <p:nvPr>
+            <p:ph type="title"/>
+          </p:nvPr>
+        </p:nvSpPr>
+        <p:spPr/>
+        <p:txBody>
+          <a:bodyPr>
+            <a:normAutofit/>
+          </a:bodyPr>
+          <a:lstStyle/>
+          <a:p>
+            <a:r>
+              <a:rPr lang="bg-BG" sz="3600" dirty="0" smtClean="0"/>
+              <a:t>Организация на графичния интерфейс</a:t>
+            </a:r>
+            <a:endParaRPr lang="bg-BG" sz="3600" dirty="0"/>
+          </a:p>
+        </p:txBody>
+      </p:sp>
+      <p:pic>
+        <p:nvPicPr>
+          <p:cNvPr id="3" name="Picture 2" descr="GUI map.png"/>
+          <p:cNvPicPr>
+            <a:picLocks noChangeAspect="1"/>
+          </p:cNvPicPr>
+          <p:nvPr/>
+        </p:nvPicPr>
+        <p:blipFill>
+          <a:blip r:embed="rId2" cstate="print"/>
+          <a:stretch>
+            <a:fillRect/>
+          </a:stretch>
+        </p:blipFill>
+        <p:spPr>
+          <a:xfrm>
+            <a:off x="482612" y="1412776"/>
+            <a:ext cx="8178776" cy="5112568"/>
+          </a:xfrm>
+          <a:prstGeom prst="rect">
+            <a:avLst/>
+          </a:prstGeom>
+        </p:spPr>
+      </p:pic>
+    </p:spTree>
+  </p:cSld>
+  <p:clrMapOvr>
+    <a:masterClrMapping/>
+  </p:clrMapOvr>
+</p:sld>
+</file>
+
+<file path=ppt/slides/slide11.xml><?xml version="1.0" encoding="utf-8"?>
+<p:sld xmlns:a="http://schemas.openxmlformats.org/drawingml/2006/main" xmlns:r="http://schemas.openxmlformats.org/officeDocument/2006/relationships" xmlns:p="http://schemas.openxmlformats.org/presentationml/2006/main">
+  <p:cSld>
+    <p:spTree>
+      <p:nvGrpSpPr>
+        <p:cNvPr id="1" name=""/>
+        <p:cNvGrpSpPr/>
+        <p:nvPr/>
+      </p:nvGrpSpPr>
+      <p:grpSpPr>
+        <a:xfrm>
+          <a:off x="0" y="0"/>
+          <a:ext cx="0" cy="0"/>
+          <a:chOff x="0" y="0"/>
+          <a:chExt cx="0" cy="0"/>
+        </a:xfrm>
+      </p:grpSpPr>
+      <p:sp>
+        <p:nvSpPr>
+          <p:cNvPr id="2" name="Title 1"/>
+          <p:cNvSpPr>
+            <a:spLocks noGrp="1"/>
+          </p:cNvSpPr>
+          <p:nvPr>
+            <p:ph type="title"/>
+          </p:nvPr>
+        </p:nvSpPr>
+        <p:spPr>
+          <a:xfrm>
+            <a:off x="457200" y="-171400"/>
+            <a:ext cx="8229600" cy="1143000"/>
+          </a:xfrm>
+        </p:spPr>
+        <p:txBody>
+          <a:bodyPr>
+            <a:normAutofit/>
+          </a:bodyPr>
+          <a:lstStyle/>
+          <a:p>
+            <a:r>
+              <a:rPr lang="bg-BG" sz="3600" dirty="0" smtClean="0"/>
+              <a:t>Дебъгване на симулационен цикъл</a:t>
+            </a:r>
+            <a:endParaRPr lang="bg-BG" sz="3600" dirty="0"/>
+          </a:p>
+        </p:txBody>
+      </p:sp>
+      <p:pic>
+        <p:nvPicPr>
+          <p:cNvPr id="4" name="Picture 3" descr="StepInto.png"/>
+          <p:cNvPicPr/>
+          <p:nvPr/>
+        </p:nvPicPr>
+        <p:blipFill>
+          <a:blip r:embed="rId2" cstate="print"/>
+          <a:stretch>
+            <a:fillRect/>
+          </a:stretch>
+        </p:blipFill>
+        <p:spPr>
+          <a:xfrm>
+            <a:off x="2555776" y="768909"/>
+            <a:ext cx="5796137" cy="2205496"/>
+          </a:xfrm>
+          <a:prstGeom prst="rect">
+            <a:avLst/>
+          </a:prstGeom>
+        </p:spPr>
+      </p:pic>
+      <p:pic>
+        <p:nvPicPr>
+          <p:cNvPr id="5" name="Picture 4" descr="StepOver.png"/>
+          <p:cNvPicPr/>
+          <p:nvPr/>
+        </p:nvPicPr>
+        <p:blipFill>
+          <a:blip r:embed="rId3" cstate="print"/>
+          <a:stretch>
+            <a:fillRect/>
+          </a:stretch>
+        </p:blipFill>
+        <p:spPr>
+          <a:xfrm>
+            <a:off x="2555776" y="2924944"/>
+            <a:ext cx="5807189" cy="1982458"/>
+          </a:xfrm>
+          <a:prstGeom prst="rect">
+            <a:avLst/>
+          </a:prstGeom>
+        </p:spPr>
+      </p:pic>
+      <p:pic>
+        <p:nvPicPr>
+          <p:cNvPr id="6" name="Picture 5" descr="StepOut.png"/>
+          <p:cNvPicPr/>
+          <p:nvPr/>
+        </p:nvPicPr>
+        <p:blipFill>
+          <a:blip r:embed="rId4" cstate="print"/>
+          <a:stretch>
+            <a:fillRect/>
+          </a:stretch>
+        </p:blipFill>
+        <p:spPr>
+          <a:xfrm>
+            <a:off x="2555776" y="4859539"/>
+            <a:ext cx="5807187" cy="1998461"/>
+          </a:xfrm>
+          <a:prstGeom prst="rect">
+            <a:avLst/>
+          </a:prstGeom>
+        </p:spPr>
+      </p:pic>
+      <p:sp>
+        <p:nvSpPr>
+          <p:cNvPr id="8" name="TextBox 7"/>
+          <p:cNvSpPr txBox="1"/>
+          <p:nvPr/>
+        </p:nvSpPr>
+        <p:spPr>
+          <a:xfrm>
+            <a:off x="755576" y="1691516"/>
+            <a:ext cx="1140633" cy="369332"/>
+          </a:xfrm>
+          <a:prstGeom prst="rect">
+            <a:avLst/>
+          </a:prstGeom>
+          <a:noFill/>
+        </p:spPr>
+        <p:txBody>
+          <a:bodyPr wrap="none" rtlCol="0">
+            <a:spAutoFit/>
+          </a:bodyPr>
+          <a:lstStyle/>
+          <a:p>
+            <a:r>
+              <a:rPr lang="bg-BG" b="1" dirty="0" smtClean="0"/>
+              <a:t>Потъване</a:t>
+            </a:r>
+            <a:endParaRPr lang="bg-BG" b="1" dirty="0"/>
+          </a:p>
+        </p:txBody>
+      </p:sp>
+      <p:sp>
+        <p:nvSpPr>
+          <p:cNvPr id="9" name="TextBox 8"/>
+          <p:cNvSpPr txBox="1"/>
+          <p:nvPr/>
+        </p:nvSpPr>
+        <p:spPr>
+          <a:xfrm>
+            <a:off x="755576" y="3815752"/>
+            <a:ext cx="1476686" cy="369332"/>
+          </a:xfrm>
+          <a:prstGeom prst="rect">
+            <a:avLst/>
+          </a:prstGeom>
+          <a:noFill/>
+        </p:spPr>
+        <p:txBody>
+          <a:bodyPr wrap="none" rtlCol="0">
+            <a:spAutoFit/>
+          </a:bodyPr>
+          <a:lstStyle/>
+          <a:p>
+            <a:r>
+              <a:rPr lang="bg-BG" b="1" dirty="0" smtClean="0"/>
+              <a:t>Престъпване</a:t>
+            </a:r>
+            <a:endParaRPr lang="bg-BG" b="1" dirty="0"/>
+          </a:p>
+        </p:txBody>
+      </p:sp>
+      <p:sp>
+        <p:nvSpPr>
+          <p:cNvPr id="10" name="TextBox 9"/>
+          <p:cNvSpPr txBox="1"/>
+          <p:nvPr/>
+        </p:nvSpPr>
+        <p:spPr>
+          <a:xfrm>
+            <a:off x="755576" y="5939988"/>
+            <a:ext cx="1257075" cy="369332"/>
+          </a:xfrm>
+          <a:prstGeom prst="rect">
+            <a:avLst/>
+          </a:prstGeom>
+          <a:noFill/>
+        </p:spPr>
+        <p:txBody>
+          <a:bodyPr wrap="none" rtlCol="0">
+            <a:spAutoFit/>
+          </a:bodyPr>
+          <a:lstStyle/>
+          <a:p>
+            <a:r>
+              <a:rPr lang="bg-BG" b="1" dirty="0" smtClean="0"/>
+              <a:t>Изплуване</a:t>
+            </a:r>
+            <a:endParaRPr lang="bg-BG" b="1" dirty="0"/>
+          </a:p>
+        </p:txBody>
+      </p:sp>
+    </p:spTree>
+  </p:cSld>
+  <p:clrMapOvr>
+    <a:masterClrMapping/>
+  </p:clrMapOvr>
+</p:sld>
+</file>
+
+<file path=ppt/slides/slide12.xml><?xml version="1.0" encoding="utf-8"?>
+<p:sld xmlns:a="http://schemas.openxmlformats.org/drawingml/2006/main" xmlns:r="http://schemas.openxmlformats.org/officeDocument/2006/relationships" xmlns:p="http://schemas.openxmlformats.org/presentationml/2006/main">
+  <p:cSld>
+    <p:spTree>
+      <p:nvGrpSpPr>
+        <p:cNvPr id="1" name=""/>
+        <p:cNvGrpSpPr/>
+        <p:nvPr/>
+      </p:nvGrpSpPr>
+      <p:grpSpPr>
+        <a:xfrm>
+          <a:off x="0" y="0"/>
+          <a:ext cx="0" cy="0"/>
+          <a:chOff x="0" y="0"/>
+          <a:chExt cx="0" cy="0"/>
+        </a:xfrm>
+      </p:grpSpPr>
+      <p:pic>
+        <p:nvPicPr>
+          <p:cNvPr id="3" name="Demo.mp4">
+            <a:hlinkClick r:id="" action="ppaction://media"/>
+          </p:cNvPr>
+          <p:cNvPicPr>
+            <a:picLocks noRot="1" noChangeAspect="1"/>
+          </p:cNvPicPr>
+          <p:nvPr>
+            <a:videoFile r:link="rId1"/>
+          </p:nvPr>
+        </p:nvPicPr>
+        <p:blipFill>
+          <a:blip r:embed="rId3" cstate="print"/>
+          <a:stretch>
+            <a:fillRect/>
+          </a:stretch>
+        </p:blipFill>
+        <p:spPr>
+          <a:xfrm>
+            <a:off x="19494" y="1268760"/>
+            <a:ext cx="9089010" cy="5112568"/>
+          </a:xfrm>
+          <a:prstGeom prst="rect">
+            <a:avLst/>
+          </a:prstGeom>
+        </p:spPr>
+      </p:pic>
+      <p:sp>
+        <p:nvSpPr>
+          <p:cNvPr id="5" name="Title 4"/>
+          <p:cNvSpPr>
+            <a:spLocks noGrp="1"/>
+          </p:cNvSpPr>
+          <p:nvPr>
+            <p:ph type="title"/>
+          </p:nvPr>
+        </p:nvSpPr>
+        <p:spPr/>
+        <p:txBody>
+          <a:bodyPr>
+            <a:normAutofit/>
+          </a:bodyPr>
+          <a:lstStyle/>
+          <a:p>
+            <a:r>
+              <a:rPr lang="bg-BG" sz="3600" dirty="0" smtClean="0"/>
+              <a:t>Демонстрация на приложението</a:t>
+            </a:r>
+            <a:endParaRPr lang="bg-BG" sz="3600" dirty="0"/>
+          </a:p>
+        </p:txBody>
+      </p:sp>
+    </p:spTree>
+  </p:cSld>
+  <p:clrMapOvr>
+    <a:masterClrMapping/>
+  </p:clrMapOvr>
+  <p:timing>
+    <p:tnLst>
+      <p:par>
+        <p:cTn id="1" dur="indefinite" restart="never" nodeType="tmRoot">
+          <p:childTnLst>
+            <p:seq concurrent="1" nextAc="seek">
+              <p:cTn id="2" restart="whenNotActive" fill="hold" evtFilter="cancelBubble" nodeType="interactiveSeq">
+                <p:stCondLst>
+                  <p:cond evt="onClick" delay="0">
+                    <p:tgtEl>
+                      <p:spTgt spid="3"/>
+                    </p:tgtEl>
+                  </p:cond>
+                </p:stCondLst>
+                <p:endSync evt="end" delay="0">
+                  <p:rtn val="all"/>
+                </p:endSync>
+                <p:childTnLst>
+                  <p:par>
+                    <p:cTn id="3" fill="hold">
+                      <p:stCondLst>
+                        <p:cond delay="0"/>
+                      </p:stCondLst>
+                      <p:childTnLst>
+                        <p:par>
+                          <p:cTn id="4" fill="hold">
+                            <p:stCondLst>
+                              <p:cond delay="0"/>
+                            </p:stCondLst>
+                            <p:childTnLst>
+                              <p:par>
+                                <p:cTn id="5" presetID="2" presetClass="mediacall" presetSubtype="0" fill="hold" nodeType="clickEffect">
+                                  <p:stCondLst>
+                                    <p:cond delay="0"/>
+                                  </p:stCondLst>
+                                  <p:childTnLst>
+                                    <p:cmd type="call" cmd="togglePause">
+                                      <p:cBhvr>
+                                        <p:cTn id="6" dur="1" fill="hold"/>
+                                        <p:tgtEl>
+                                          <p:spTgt spid="3"/>
+                                        </p:tgtEl>
+                                      </p:cBhvr>
+                                    </p:cmd>
+                                  </p:childTnLst>
+                                </p:cTn>
+                              </p:par>
+                            </p:childTnLst>
+                          </p:cTn>
+                        </p:par>
+                      </p:childTnLst>
+                    </p:cTn>
+                  </p:par>
+                </p:childTnLst>
+              </p:cTn>
+              <p:nextCondLst>
+                <p:cond evt="onClick" delay="0">
+                  <p:tgtEl>
+                    <p:spTgt spid="3"/>
+                  </p:tgtEl>
+                </p:cond>
+              </p:nextCondLst>
+            </p:seq>
+            <p:video>
+              <p:cMediaNode>
+                <p:cTn id="7" fill="hold" display="0">
+                  <p:stCondLst>
+                    <p:cond delay="indefinite"/>
+                  </p:stCondLst>
+                  <p:endCondLst>
+                    <p:cond evt="onNext" delay="0">
+                      <p:tgtEl>
+                        <p:sldTgt/>
+                      </p:tgtEl>
+                    </p:cond>
+                    <p:cond evt="onPrev" delay="0">
+                      <p:tgtEl>
+                        <p:sldTgt/>
+                      </p:tgtEl>
+                    </p:cond>
+                  </p:endCondLst>
+                </p:cTn>
+                <p:tgtEl>
+                  <p:spTgt spid="3"/>
+                </p:tgtEl>
+              </p:cMediaNode>
+            </p:video>
+          </p:childTnLst>
+        </p:cTn>
+      </p:par>
+    </p:tnLst>
+  </p:timing>
+</p:sld>
+</file>
+
+<file path=ppt/slides/slide13.xml><?xml version="1.0" encoding="utf-8"?>
+<p:sld xmlns:a="http://schemas.openxmlformats.org/drawingml/2006/main" xmlns:r="http://schemas.openxmlformats.org/officeDocument/2006/relationships" xmlns:p="http://schemas.openxmlformats.org/presentationml/2006/main">
+  <p:cSld>
+    <p:spTree>
+      <p:nvGrpSpPr>
+        <p:cNvPr id="1" name=""/>
+        <p:cNvGrpSpPr/>
+        <p:nvPr/>
+      </p:nvGrpSpPr>
+      <p:grpSpPr>
+        <a:xfrm>
+          <a:off x="0" y="0"/>
+          <a:ext cx="0" cy="0"/>
+          <a:chOff x="0" y="0"/>
+          <a:chExt cx="0" cy="0"/>
+        </a:xfrm>
+      </p:grpSpPr>
+      <p:sp>
+        <p:nvSpPr>
+          <p:cNvPr id="2" name="Title 1"/>
+          <p:cNvSpPr>
+            <a:spLocks noGrp="1"/>
+          </p:cNvSpPr>
+          <p:nvPr>
+            <p:ph type="ctrTitle"/>
+          </p:nvPr>
+        </p:nvSpPr>
+        <p:spPr/>
+        <p:txBody>
+          <a:bodyPr/>
+          <a:lstStyle/>
+          <a:p>
+            <a:r>
+              <a:rPr lang="bg-BG" dirty="0" smtClean="0"/>
+              <a:t>Благодаря за вниманието!</a:t>
+            </a:r>
+            <a:endParaRPr lang="bg-BG" dirty="0"/>
+          </a:p>
+        </p:txBody>
+      </p:sp>
+      <p:sp>
+        <p:nvSpPr>
+          <p:cNvPr id="3" name="Subtitle 2"/>
+          <p:cNvSpPr>
+            <a:spLocks noGrp="1"/>
+          </p:cNvSpPr>
+          <p:nvPr>
+            <p:ph type="subTitle" idx="1"/>
+          </p:nvPr>
+        </p:nvSpPr>
+        <p:spPr/>
+        <p:txBody>
+          <a:bodyPr/>
+          <a:lstStyle/>
+          <a:p>
+            <a:r>
+              <a:rPr lang="bg-BG" dirty="0" smtClean="0"/>
+              <a:t>Въпроси?</a:t>
+            </a:r>
+          </a:p>
+          <a:p>
+            <a:r>
+              <a:rPr lang="en-US" dirty="0" smtClean="0"/>
+              <a:t>sivodaskalov@gmail.com</a:t>
+            </a:r>
+            <a:endParaRPr lang="bg-BG" dirty="0"/>
+          </a:p>
+        </p:txBody>
+      </p:sp>
+    </p:spTree>
+  </p:cSld>
+  <p:clrMapOvr>
+    <a:masterClrMapping/>
+  </p:clrMapOvr>
+</p:sld>
+</file>
+
 <file path=ppt/slides/slide2.xml><?xml version="1.0" encoding="utf-8"?>
 <p:sld xmlns:a="http://schemas.openxmlformats.org/drawingml/2006/main" xmlns:r="http://schemas.openxmlformats.org/officeDocument/2006/relationships" xmlns:p="http://schemas.openxmlformats.org/presentationml/2006/main">
   <p:cSld>
@@ -3335,25 +3871,66 @@
           <a:p>
             <a:r>
               <a:rPr lang="bg-BG" sz="1800" dirty="0" smtClean="0"/>
-              <a:t>Даннов модел - акценти</a:t>
-            </a:r>
+              <a:t>Операционни възли и променливи</a:t>
+            </a:r>
+            <a:endParaRPr lang="bg-BG" sz="1800" dirty="0" smtClean="0"/>
           </a:p>
           <a:p>
             <a:r>
               <a:rPr lang="bg-BG" sz="1800" dirty="0" smtClean="0"/>
-              <a:t>Сървърен модул – акценти</a:t>
-            </a:r>
-          </a:p>
-          <a:p>
+              <a:t>Симулационна </a:t>
+            </a:r>
+            <a:r>
+              <a:rPr lang="en-US" sz="1800" dirty="0" smtClean="0"/>
+              <a:t>XML </a:t>
+            </a:r>
             <a:r>
               <a:rPr lang="bg-BG" sz="1800" dirty="0" smtClean="0"/>
-              <a:t>Клиентски модул – акценти</a:t>
+              <a:t>конфигурация</a:t>
             </a:r>
           </a:p>
           <a:p>
             <a:r>
               <a:rPr lang="bg-BG" sz="1800" dirty="0" smtClean="0"/>
-              <a:t>Тестване и анализ на производителността</a:t>
+              <a:t>Оптимизация на </a:t>
+            </a:r>
+            <a:r>
+              <a:rPr lang="bg-BG" sz="1800" dirty="0" smtClean="0"/>
+              <a:t>симулациите</a:t>
+            </a:r>
+          </a:p>
+          <a:p>
+            <a:r>
+              <a:rPr lang="bg-BG" sz="1800" dirty="0" smtClean="0"/>
+              <a:t>Организация на графичния интерфейс</a:t>
+            </a:r>
+            <a:endParaRPr lang="bg-BG" sz="1800" dirty="0" smtClean="0"/>
+          </a:p>
+          <a:p>
+            <a:r>
+              <a:rPr lang="bg-BG" sz="1800" dirty="0" smtClean="0"/>
+              <a:t>Дебъгване на симулационен </a:t>
+            </a:r>
+            <a:r>
+              <a:rPr lang="bg-BG" sz="1800" dirty="0" smtClean="0"/>
+              <a:t>цикъл</a:t>
+            </a:r>
+          </a:p>
+          <a:p>
+            <a:r>
+              <a:rPr lang="bg-BG" sz="1800" dirty="0" smtClean="0"/>
+              <a:t>Демонстрация на приложението</a:t>
+            </a:r>
+            <a:endParaRPr lang="bg-BG" sz="1800" dirty="0" smtClean="0"/>
+          </a:p>
+          <a:p>
+            <a:r>
+              <a:rPr lang="bg-BG" sz="1800" dirty="0" smtClean="0"/>
+              <a:t>Тестване </a:t>
+            </a:r>
+            <a:r>
+              <a:rPr lang="bg-BG" sz="1800" dirty="0" smtClean="0"/>
+              <a:t>и анализ на производителността</a:t>
             </a:r>
           </a:p>
           <a:p>
@@ -4231,7 +4808,7 @@
         </p:nvSpPr>
         <p:spPr>
           <a:xfrm>
-            <a:off x="1043608" y="4653136"/>
+            <a:off x="1043608" y="4376138"/>
             <a:ext cx="1824410" cy="1477328"/>
           </a:xfrm>
           <a:prstGeom prst="rect">
@@ -4533,7 +5110,7 @@
         </p:nvSpPr>
         <p:spPr>
           <a:xfrm>
-            <a:off x="5940152" y="1628800"/>
+            <a:off x="5483552" y="1628800"/>
             <a:ext cx="2031325" cy="2031325"/>
           </a:xfrm>
           <a:prstGeom prst="rect">

</xml_diff>